<commit_message>
instruction window change and collision with walls.
</commit_message>
<xml_diff>
--- a/instructions.pptx
+++ b/instructions.pptx
@@ -104,6 +104,11 @@
       </a:defRPr>
     </a:lvl9pPr>
   </p:defaultTextStyle>
+  <p:extLst>
+    <p:ext uri="{EFAFB233-063F-42B5-8137-9DF3F51BA10A}">
+      <p15:sldGuideLst xmlns:p15="http://schemas.microsoft.com/office/powerpoint/2012/main"/>
+    </p:ext>
+  </p:extLst>
 </p:presentation>
 </file>
 
@@ -3364,7 +3369,7 @@
         </p:nvSpPr>
         <p:spPr>
           <a:xfrm>
-            <a:off x="2103120" y="587829"/>
+            <a:off x="1371665" y="93841"/>
             <a:ext cx="9196251" cy="6764159"/>
           </a:xfrm>
           <a:prstGeom prst="rect">
@@ -3456,7 +3461,15 @@
             </a:pPr>
             <a:r>
               <a:rPr lang="he-IL" sz="2400" dirty="0"/>
-              <a:t>		- קופסאות נעות. היזהר שלא יתנגשו בך.</a:t>
+              <a:t>		- קופסאות נעות. היזהר שלא יתנגשו בך</a:t>
+            </a:r>
+            <a:r>
+              <a:rPr lang="en-US" sz="2400" dirty="0"/>
+              <a:t> </a:t>
+            </a:r>
+            <a:r>
+              <a:rPr lang="he-IL" sz="2400" dirty="0"/>
+              <a:t> (מוריד חיים).</a:t>
             </a:r>
           </a:p>
           <a:p>
@@ -3475,7 +3488,7 @@
             </a:pPr>
             <a:r>
               <a:rPr lang="he-IL" sz="2400" dirty="0"/>
-              <a:t>		- קופסאות מתפוצצות. היזהר שלא לגעת בהן.</a:t>
+              <a:t>		- קופסאות מתפוצצות. היזהר שלא לגעת בהן (מוריד חיים).</a:t>
             </a:r>
           </a:p>
           <a:p>
@@ -3492,7 +3505,10 @@
                 <a:spcPct val="150000"/>
               </a:lnSpc>
             </a:pPr>
-            <a:endParaRPr lang="he-IL" sz="2400" dirty="0"/>
+            <a:r>
+              <a:rPr lang="he-IL" sz="2400" dirty="0"/>
+              <a:t>                      - פורטל. מעבר דרכו מעביר לשלב הבא.  </a:t>
+            </a:r>
           </a:p>
           <a:p>
             <a:pPr>
@@ -3526,7 +3542,7 @@
         </p:blipFill>
         <p:spPr>
           <a:xfrm>
-            <a:off x="9448324" y="2841572"/>
+            <a:off x="9029224" y="2374847"/>
             <a:ext cx="1372011" cy="1122793"/>
           </a:xfrm>
           <a:prstGeom prst="rect">
@@ -3556,7 +3572,7 @@
         </p:blipFill>
         <p:spPr>
           <a:xfrm>
-            <a:off x="9402874" y="5037645"/>
+            <a:off x="8983774" y="4570920"/>
             <a:ext cx="1372012" cy="1146514"/>
           </a:xfrm>
           <a:prstGeom prst="rect">
@@ -3586,8 +3602,44 @@
         </p:blipFill>
         <p:spPr>
           <a:xfrm>
-            <a:off x="9482741" y="3909213"/>
+            <a:off x="9063641" y="3442488"/>
             <a:ext cx="1212277" cy="1099690"/>
+          </a:xfrm>
+          <a:prstGeom prst="rect">
+            <a:avLst/>
+          </a:prstGeom>
+        </p:spPr>
+      </p:pic>
+      <p:pic>
+        <p:nvPicPr>
+          <p:cNvPr id="3" name="Picture 2">
+            <a:extLst>
+              <a:ext uri="{FF2B5EF4-FFF2-40B4-BE49-F238E27FC236}">
+                <a16:creationId xmlns:a16="http://schemas.microsoft.com/office/drawing/2014/main" id="{A0BE66C4-B5D1-4BAA-962A-181FCE983FC0}"/>
+              </a:ext>
+            </a:extLst>
+          </p:cNvPr>
+          <p:cNvPicPr>
+            <a:picLocks noChangeAspect="1"/>
+          </p:cNvPicPr>
+          <p:nvPr/>
+        </p:nvPicPr>
+        <p:blipFill>
+          <a:blip r:embed="rId5">
+            <a:extLst>
+              <a:ext uri="{28A0092B-C50C-407E-A947-70E740481C1C}">
+                <a14:useLocalDpi xmlns:a14="http://schemas.microsoft.com/office/drawing/2010/main" val="0"/>
+              </a:ext>
+            </a:extLst>
+          </a:blip>
+          <a:stretch>
+            <a:fillRect/>
+          </a:stretch>
+        </p:blipFill>
+        <p:spPr>
+          <a:xfrm>
+            <a:off x="9248775" y="5676494"/>
+            <a:ext cx="903318" cy="981481"/>
           </a:xfrm>
           <a:prstGeom prst="rect">
             <a:avLst/>

</xml_diff>